<commit_message>
V0.0.3 - Vierter Tag
</commit_message>
<xml_diff>
--- a/PowerPoints/TaRest Notizen.pptx
+++ b/PowerPoints/TaRest Notizen.pptx
@@ -5,7 +5,7 @@
     <p:sldMasterId id="2147483660" r:id="rId1"/>
   </p:sldMasterIdLst>
   <p:notesMasterIdLst>
-    <p:notesMasterId r:id="rId15"/>
+    <p:notesMasterId r:id="rId14"/>
   </p:notesMasterIdLst>
   <p:sldIdLst>
     <p:sldId id="256" r:id="rId2"/>
@@ -20,7 +20,6 @@
     <p:sldId id="263" r:id="rId11"/>
     <p:sldId id="264" r:id="rId12"/>
     <p:sldId id="266" r:id="rId13"/>
-    <p:sldId id="262" r:id="rId14"/>
   </p:sldIdLst>
   <p:sldSz cx="9906000" cy="6858000" type="A4"/>
   <p:notesSz cx="6858000" cy="9144000"/>
@@ -223,7 +222,7 @@
           <a:p>
             <a:fld id="{2E39C2C9-676C-A049-AAF4-736F116D4D92}" type="datetimeFigureOut">
               <a:rPr lang="de-DE" smtClean="0"/>
-              <a:t>13.05.21</a:t>
+              <a:t>14.05.21</a:t>
             </a:fld>
             <a:endParaRPr lang="de-DE"/>
           </a:p>
@@ -621,7 +620,7 @@
           <a:p>
             <a:fld id="{D135A461-9A79-C14A-A0D2-94030ADA0C4E}" type="datetimeFigureOut">
               <a:rPr lang="de-DE" smtClean="0"/>
-              <a:t>13.05.21</a:t>
+              <a:t>14.05.21</a:t>
             </a:fld>
             <a:endParaRPr lang="de-DE"/>
           </a:p>
@@ -791,7 +790,7 @@
           <a:p>
             <a:fld id="{D135A461-9A79-C14A-A0D2-94030ADA0C4E}" type="datetimeFigureOut">
               <a:rPr lang="de-DE" smtClean="0"/>
-              <a:t>13.05.21</a:t>
+              <a:t>14.05.21</a:t>
             </a:fld>
             <a:endParaRPr lang="de-DE"/>
           </a:p>
@@ -971,7 +970,7 @@
           <a:p>
             <a:fld id="{D135A461-9A79-C14A-A0D2-94030ADA0C4E}" type="datetimeFigureOut">
               <a:rPr lang="de-DE" smtClean="0"/>
-              <a:t>13.05.21</a:t>
+              <a:t>14.05.21</a:t>
             </a:fld>
             <a:endParaRPr lang="de-DE"/>
           </a:p>
@@ -1151,7 +1150,7 @@
           <a:p>
             <a:fld id="{D135A461-9A79-C14A-A0D2-94030ADA0C4E}" type="datetimeFigureOut">
               <a:rPr lang="de-DE" smtClean="0"/>
-              <a:t>13.05.21</a:t>
+              <a:t>14.05.21</a:t>
             </a:fld>
             <a:endParaRPr lang="de-DE"/>
           </a:p>
@@ -1395,7 +1394,7 @@
           <a:p>
             <a:fld id="{D135A461-9A79-C14A-A0D2-94030ADA0C4E}" type="datetimeFigureOut">
               <a:rPr lang="de-DE" smtClean="0"/>
-              <a:t>13.05.21</a:t>
+              <a:t>14.05.21</a:t>
             </a:fld>
             <a:endParaRPr lang="de-DE"/>
           </a:p>
@@ -1627,7 +1626,7 @@
           <a:p>
             <a:fld id="{D135A461-9A79-C14A-A0D2-94030ADA0C4E}" type="datetimeFigureOut">
               <a:rPr lang="de-DE" smtClean="0"/>
-              <a:t>13.05.21</a:t>
+              <a:t>14.05.21</a:t>
             </a:fld>
             <a:endParaRPr lang="de-DE"/>
           </a:p>
@@ -1994,7 +1993,7 @@
           <a:p>
             <a:fld id="{D135A461-9A79-C14A-A0D2-94030ADA0C4E}" type="datetimeFigureOut">
               <a:rPr lang="de-DE" smtClean="0"/>
-              <a:t>13.05.21</a:t>
+              <a:t>14.05.21</a:t>
             </a:fld>
             <a:endParaRPr lang="de-DE"/>
           </a:p>
@@ -2112,7 +2111,7 @@
           <a:p>
             <a:fld id="{D135A461-9A79-C14A-A0D2-94030ADA0C4E}" type="datetimeFigureOut">
               <a:rPr lang="de-DE" smtClean="0"/>
-              <a:t>13.05.21</a:t>
+              <a:t>14.05.21</a:t>
             </a:fld>
             <a:endParaRPr lang="de-DE"/>
           </a:p>
@@ -2207,7 +2206,7 @@
           <a:p>
             <a:fld id="{D135A461-9A79-C14A-A0D2-94030ADA0C4E}" type="datetimeFigureOut">
               <a:rPr lang="de-DE" smtClean="0"/>
-              <a:t>13.05.21</a:t>
+              <a:t>14.05.21</a:t>
             </a:fld>
             <a:endParaRPr lang="de-DE"/>
           </a:p>
@@ -2484,7 +2483,7 @@
           <a:p>
             <a:fld id="{D135A461-9A79-C14A-A0D2-94030ADA0C4E}" type="datetimeFigureOut">
               <a:rPr lang="de-DE" smtClean="0"/>
-              <a:t>13.05.21</a:t>
+              <a:t>14.05.21</a:t>
             </a:fld>
             <a:endParaRPr lang="de-DE"/>
           </a:p>
@@ -2741,7 +2740,7 @@
           <a:p>
             <a:fld id="{D135A461-9A79-C14A-A0D2-94030ADA0C4E}" type="datetimeFigureOut">
               <a:rPr lang="de-DE" smtClean="0"/>
-              <a:t>13.05.21</a:t>
+              <a:t>14.05.21</a:t>
             </a:fld>
             <a:endParaRPr lang="de-DE"/>
           </a:p>
@@ -2954,7 +2953,7 @@
           <a:p>
             <a:fld id="{D135A461-9A79-C14A-A0D2-94030ADA0C4E}" type="datetimeFigureOut">
               <a:rPr lang="de-DE" smtClean="0"/>
-              <a:t>13.05.21</a:t>
+              <a:t>14.05.21</a:t>
             </a:fld>
             <a:endParaRPr lang="de-DE"/>
           </a:p>
@@ -3451,7 +3450,7 @@
             </a:r>
             <a:fld id="{708BF0F0-9BC6-E540-BA01-080340F69A97}" type="datetime1">
               <a:rPr lang="de-DE"/>
-              <a:t>13.05.21</a:t>
+              <a:t>14.05.21</a:t>
             </a:fld>
             <a:endParaRPr lang="de-DE" dirty="0"/>
           </a:p>
@@ -4160,146 +4159,6 @@
     <p:extLst>
       <p:ext uri="{BB962C8B-B14F-4D97-AF65-F5344CB8AC3E}">
         <p14:creationId xmlns:p14="http://schemas.microsoft.com/office/powerpoint/2010/main" val="891077633"/>
-      </p:ext>
-    </p:extLst>
-  </p:cSld>
-  <p:clrMapOvr>
-    <a:masterClrMapping/>
-  </p:clrMapOvr>
-</p:sld>
-</file>
-
-<file path=ppt/slides/slide13.xml><?xml version="1.0" encoding="utf-8"?>
-<p:sld xmlns:a="http://schemas.openxmlformats.org/drawingml/2006/main" xmlns:r="http://schemas.openxmlformats.org/officeDocument/2006/relationships" xmlns:p="http://schemas.openxmlformats.org/presentationml/2006/main">
-  <p:cSld>
-    <p:spTree>
-      <p:nvGrpSpPr>
-        <p:cNvPr id="1" name=""/>
-        <p:cNvGrpSpPr/>
-        <p:nvPr/>
-      </p:nvGrpSpPr>
-      <p:grpSpPr>
-        <a:xfrm>
-          <a:off x="0" y="0"/>
-          <a:ext cx="0" cy="0"/>
-          <a:chOff x="0" y="0"/>
-          <a:chExt cx="0" cy="0"/>
-        </a:xfrm>
-      </p:grpSpPr>
-      <p:sp>
-        <p:nvSpPr>
-          <p:cNvPr id="2" name="Titel 1">
-            <a:extLst>
-              <a:ext uri="{FF2B5EF4-FFF2-40B4-BE49-F238E27FC236}">
-                <a16:creationId xmlns:a16="http://schemas.microsoft.com/office/drawing/2014/main" id="{8C64A780-9D1F-1D48-BCB5-8ACDF6600470}"/>
-              </a:ext>
-            </a:extLst>
-          </p:cNvPr>
-          <p:cNvSpPr>
-            <a:spLocks noGrp="1"/>
-          </p:cNvSpPr>
-          <p:nvPr>
-            <p:ph type="title"/>
-          </p:nvPr>
-        </p:nvSpPr>
-        <p:spPr/>
-        <p:txBody>
-          <a:bodyPr/>
-          <a:lstStyle/>
-          <a:p>
-            <a:r>
-              <a:rPr lang="de-DE" dirty="0" err="1"/>
-              <a:t>notes</a:t>
-            </a:r>
-            <a:endParaRPr lang="de-DE" dirty="0"/>
-          </a:p>
-        </p:txBody>
-      </p:sp>
-      <p:sp>
-        <p:nvSpPr>
-          <p:cNvPr id="3" name="Inhaltsplatzhalter 2">
-            <a:extLst>
-              <a:ext uri="{FF2B5EF4-FFF2-40B4-BE49-F238E27FC236}">
-                <a16:creationId xmlns:a16="http://schemas.microsoft.com/office/drawing/2014/main" id="{270A7EFA-F90D-CA43-97EE-14C59D7E78B8}"/>
-              </a:ext>
-            </a:extLst>
-          </p:cNvPr>
-          <p:cNvSpPr>
-            <a:spLocks noGrp="1"/>
-          </p:cNvSpPr>
-          <p:nvPr>
-            <p:ph idx="1"/>
-          </p:nvPr>
-        </p:nvSpPr>
-        <p:spPr/>
-        <p:txBody>
-          <a:bodyPr/>
-          <a:lstStyle/>
-          <a:p>
-            <a:r>
-              <a:rPr lang="de-DE" dirty="0"/>
-              <a:t>https://</a:t>
-            </a:r>
-            <a:r>
-              <a:rPr lang="de-DE" dirty="0" err="1"/>
-              <a:t>stackoverflow.com</a:t>
-            </a:r>
-            <a:r>
-              <a:rPr lang="de-DE" dirty="0"/>
-              <a:t>/</a:t>
-            </a:r>
-            <a:r>
-              <a:rPr lang="de-DE" dirty="0" err="1"/>
-              <a:t>questions</a:t>
-            </a:r>
-            <a:r>
-              <a:rPr lang="de-DE" dirty="0"/>
-              <a:t>/33542905/</a:t>
-            </a:r>
-            <a:r>
-              <a:rPr lang="de-DE" dirty="0" err="1"/>
-              <a:t>highlighting</a:t>
-            </a:r>
-            <a:r>
-              <a:rPr lang="de-DE" dirty="0"/>
-              <a:t>-</a:t>
-            </a:r>
-            <a:r>
-              <a:rPr lang="de-DE" dirty="0" err="1"/>
-              <a:t>search</a:t>
-            </a:r>
-            <a:r>
-              <a:rPr lang="de-DE" dirty="0"/>
-              <a:t>-</a:t>
-            </a:r>
-            <a:r>
-              <a:rPr lang="de-DE" dirty="0" err="1"/>
-              <a:t>result</a:t>
-            </a:r>
-            <a:r>
-              <a:rPr lang="de-DE" dirty="0"/>
-              <a:t>-in-</a:t>
-            </a:r>
-            <a:r>
-              <a:rPr lang="de-DE" dirty="0" err="1"/>
-              <a:t>uitableview</a:t>
-            </a:r>
-            <a:r>
-              <a:rPr lang="de-DE" dirty="0"/>
-              <a:t>-</a:t>
-            </a:r>
-            <a:r>
-              <a:rPr lang="de-DE" dirty="0" err="1"/>
-              <a:t>cell-ios-swift</a:t>
-            </a:r>
-            <a:endParaRPr lang="de-DE" dirty="0"/>
-          </a:p>
-        </p:txBody>
-      </p:sp>
-    </p:spTree>
-    <p:extLst>
-      <p:ext uri="{BB962C8B-B14F-4D97-AF65-F5344CB8AC3E}">
-        <p14:creationId xmlns:p14="http://schemas.microsoft.com/office/powerpoint/2010/main" val="3042287228"/>
       </p:ext>
     </p:extLst>
   </p:cSld>

</xml_diff>

<commit_message>
V0.0.4 - almost done, just some comments left to do
</commit_message>
<xml_diff>
--- a/PowerPoints/TaRest Notizen.pptx
+++ b/PowerPoints/TaRest Notizen.pptx
@@ -222,7 +222,7 @@
           <a:p>
             <a:fld id="{2E39C2C9-676C-A049-AAF4-736F116D4D92}" type="datetimeFigureOut">
               <a:rPr lang="de-DE" smtClean="0"/>
-              <a:t>14.05.21</a:t>
+              <a:t>15.05.21</a:t>
             </a:fld>
             <a:endParaRPr lang="de-DE"/>
           </a:p>
@@ -620,7 +620,7 @@
           <a:p>
             <a:fld id="{D135A461-9A79-C14A-A0D2-94030ADA0C4E}" type="datetimeFigureOut">
               <a:rPr lang="de-DE" smtClean="0"/>
-              <a:t>14.05.21</a:t>
+              <a:t>15.05.21</a:t>
             </a:fld>
             <a:endParaRPr lang="de-DE"/>
           </a:p>
@@ -790,7 +790,7 @@
           <a:p>
             <a:fld id="{D135A461-9A79-C14A-A0D2-94030ADA0C4E}" type="datetimeFigureOut">
               <a:rPr lang="de-DE" smtClean="0"/>
-              <a:t>14.05.21</a:t>
+              <a:t>15.05.21</a:t>
             </a:fld>
             <a:endParaRPr lang="de-DE"/>
           </a:p>
@@ -970,7 +970,7 @@
           <a:p>
             <a:fld id="{D135A461-9A79-C14A-A0D2-94030ADA0C4E}" type="datetimeFigureOut">
               <a:rPr lang="de-DE" smtClean="0"/>
-              <a:t>14.05.21</a:t>
+              <a:t>15.05.21</a:t>
             </a:fld>
             <a:endParaRPr lang="de-DE"/>
           </a:p>
@@ -1150,7 +1150,7 @@
           <a:p>
             <a:fld id="{D135A461-9A79-C14A-A0D2-94030ADA0C4E}" type="datetimeFigureOut">
               <a:rPr lang="de-DE" smtClean="0"/>
-              <a:t>14.05.21</a:t>
+              <a:t>15.05.21</a:t>
             </a:fld>
             <a:endParaRPr lang="de-DE"/>
           </a:p>
@@ -1394,7 +1394,7 @@
           <a:p>
             <a:fld id="{D135A461-9A79-C14A-A0D2-94030ADA0C4E}" type="datetimeFigureOut">
               <a:rPr lang="de-DE" smtClean="0"/>
-              <a:t>14.05.21</a:t>
+              <a:t>15.05.21</a:t>
             </a:fld>
             <a:endParaRPr lang="de-DE"/>
           </a:p>
@@ -1626,7 +1626,7 @@
           <a:p>
             <a:fld id="{D135A461-9A79-C14A-A0D2-94030ADA0C4E}" type="datetimeFigureOut">
               <a:rPr lang="de-DE" smtClean="0"/>
-              <a:t>14.05.21</a:t>
+              <a:t>15.05.21</a:t>
             </a:fld>
             <a:endParaRPr lang="de-DE"/>
           </a:p>
@@ -1993,7 +1993,7 @@
           <a:p>
             <a:fld id="{D135A461-9A79-C14A-A0D2-94030ADA0C4E}" type="datetimeFigureOut">
               <a:rPr lang="de-DE" smtClean="0"/>
-              <a:t>14.05.21</a:t>
+              <a:t>15.05.21</a:t>
             </a:fld>
             <a:endParaRPr lang="de-DE"/>
           </a:p>
@@ -2111,7 +2111,7 @@
           <a:p>
             <a:fld id="{D135A461-9A79-C14A-A0D2-94030ADA0C4E}" type="datetimeFigureOut">
               <a:rPr lang="de-DE" smtClean="0"/>
-              <a:t>14.05.21</a:t>
+              <a:t>15.05.21</a:t>
             </a:fld>
             <a:endParaRPr lang="de-DE"/>
           </a:p>
@@ -2206,7 +2206,7 @@
           <a:p>
             <a:fld id="{D135A461-9A79-C14A-A0D2-94030ADA0C4E}" type="datetimeFigureOut">
               <a:rPr lang="de-DE" smtClean="0"/>
-              <a:t>14.05.21</a:t>
+              <a:t>15.05.21</a:t>
             </a:fld>
             <a:endParaRPr lang="de-DE"/>
           </a:p>
@@ -2483,7 +2483,7 @@
           <a:p>
             <a:fld id="{D135A461-9A79-C14A-A0D2-94030ADA0C4E}" type="datetimeFigureOut">
               <a:rPr lang="de-DE" smtClean="0"/>
-              <a:t>14.05.21</a:t>
+              <a:t>15.05.21</a:t>
             </a:fld>
             <a:endParaRPr lang="de-DE"/>
           </a:p>
@@ -2740,7 +2740,7 @@
           <a:p>
             <a:fld id="{D135A461-9A79-C14A-A0D2-94030ADA0C4E}" type="datetimeFigureOut">
               <a:rPr lang="de-DE" smtClean="0"/>
-              <a:t>14.05.21</a:t>
+              <a:t>15.05.21</a:t>
             </a:fld>
             <a:endParaRPr lang="de-DE"/>
           </a:p>
@@ -2953,7 +2953,7 @@
           <a:p>
             <a:fld id="{D135A461-9A79-C14A-A0D2-94030ADA0C4E}" type="datetimeFigureOut">
               <a:rPr lang="de-DE" smtClean="0"/>
-              <a:t>14.05.21</a:t>
+              <a:t>15.05.21</a:t>
             </a:fld>
             <a:endParaRPr lang="de-DE"/>
           </a:p>
@@ -3450,7 +3450,7 @@
             </a:r>
             <a:fld id="{708BF0F0-9BC6-E540-BA01-080340F69A97}" type="datetime1">
               <a:rPr lang="de-DE"/>
-              <a:t>14.05.21</a:t>
+              <a:t>15.05.21</a:t>
             </a:fld>
             <a:endParaRPr lang="de-DE" dirty="0"/>
           </a:p>
@@ -8604,8 +8604,8 @@
         </p:nvSpPr>
         <p:spPr>
           <a:xfrm>
-            <a:off x="6352363" y="2379610"/>
-            <a:ext cx="2407322" cy="3858201"/>
+            <a:off x="6352363" y="2817361"/>
+            <a:ext cx="2380840" cy="3420450"/>
           </a:xfrm>
           <a:prstGeom prst="rect">
             <a:avLst/>
@@ -8734,7 +8734,7 @@
         </p:nvCxnSpPr>
         <p:spPr>
           <a:xfrm flipH="1">
-            <a:off x="6378831" y="3804311"/>
+            <a:off x="6357231" y="3782711"/>
             <a:ext cx="2380854" cy="4615"/>
           </a:xfrm>
           <a:prstGeom prst="line">
@@ -8768,14 +8768,13 @@
           </p:cNvPr>
           <p:cNvCxnSpPr>
             <a:cxnSpLocks/>
-            <a:stCxn id="92" idx="3"/>
           </p:cNvCxnSpPr>
           <p:nvPr/>
         </p:nvCxnSpPr>
         <p:spPr>
           <a:xfrm flipH="1" flipV="1">
-            <a:off x="6378831" y="4302401"/>
-            <a:ext cx="2380854" cy="6310"/>
+            <a:off x="6352348" y="4321417"/>
+            <a:ext cx="2380855" cy="1"/>
           </a:xfrm>
           <a:prstGeom prst="line">
             <a:avLst/>

</xml_diff>